<commit_message>
Updates use case etc
Updates use case etc
</commit_message>
<xml_diff>
--- a/documents/Use Case Diagram.pptx
+++ b/documents/Use Case Diagram.pptx
@@ -288,7 +288,7 @@
           <a:p>
             <a:fld id="{B4AA60AC-EAFE-B040-90AE-8434EC123AC4}" type="datetimeFigureOut">
               <a:rPr lang="da-DK" smtClean="0"/>
-              <a:t>10/05/13</a:t>
+              <a:t>14-05-2013</a:t>
             </a:fld>
             <a:endParaRPr lang="da-DK"/>
           </a:p>
@@ -330,7 +330,7 @@
           <a:p>
             <a:fld id="{34290FE4-215C-594A-9672-01BBA876ED40}" type="slidenum">
               <a:rPr lang="da-DK" smtClean="0"/>
-              <a:t>‹nr.›</a:t>
+              <a:t>‹#›</a:t>
             </a:fld>
             <a:endParaRPr lang="da-DK"/>
           </a:p>
@@ -458,7 +458,7 @@
           <a:p>
             <a:fld id="{B4AA60AC-EAFE-B040-90AE-8434EC123AC4}" type="datetimeFigureOut">
               <a:rPr lang="da-DK" smtClean="0"/>
-              <a:t>10/05/13</a:t>
+              <a:t>14-05-2013</a:t>
             </a:fld>
             <a:endParaRPr lang="da-DK"/>
           </a:p>
@@ -500,7 +500,7 @@
           <a:p>
             <a:fld id="{34290FE4-215C-594A-9672-01BBA876ED40}" type="slidenum">
               <a:rPr lang="da-DK" smtClean="0"/>
-              <a:t>‹nr.›</a:t>
+              <a:t>‹#›</a:t>
             </a:fld>
             <a:endParaRPr lang="da-DK"/>
           </a:p>
@@ -638,7 +638,7 @@
           <a:p>
             <a:fld id="{B4AA60AC-EAFE-B040-90AE-8434EC123AC4}" type="datetimeFigureOut">
               <a:rPr lang="da-DK" smtClean="0"/>
-              <a:t>10/05/13</a:t>
+              <a:t>14-05-2013</a:t>
             </a:fld>
             <a:endParaRPr lang="da-DK"/>
           </a:p>
@@ -680,7 +680,7 @@
           <a:p>
             <a:fld id="{34290FE4-215C-594A-9672-01BBA876ED40}" type="slidenum">
               <a:rPr lang="da-DK" smtClean="0"/>
-              <a:t>‹nr.›</a:t>
+              <a:t>‹#›</a:t>
             </a:fld>
             <a:endParaRPr lang="da-DK"/>
           </a:p>
@@ -808,7 +808,7 @@
           <a:p>
             <a:fld id="{B4AA60AC-EAFE-B040-90AE-8434EC123AC4}" type="datetimeFigureOut">
               <a:rPr lang="da-DK" smtClean="0"/>
-              <a:t>10/05/13</a:t>
+              <a:t>14-05-2013</a:t>
             </a:fld>
             <a:endParaRPr lang="da-DK"/>
           </a:p>
@@ -850,7 +850,7 @@
           <a:p>
             <a:fld id="{34290FE4-215C-594A-9672-01BBA876ED40}" type="slidenum">
               <a:rPr lang="da-DK" smtClean="0"/>
-              <a:t>‹nr.›</a:t>
+              <a:t>‹#›</a:t>
             </a:fld>
             <a:endParaRPr lang="da-DK"/>
           </a:p>
@@ -1054,7 +1054,7 @@
           <a:p>
             <a:fld id="{B4AA60AC-EAFE-B040-90AE-8434EC123AC4}" type="datetimeFigureOut">
               <a:rPr lang="da-DK" smtClean="0"/>
-              <a:t>10/05/13</a:t>
+              <a:t>14-05-2013</a:t>
             </a:fld>
             <a:endParaRPr lang="da-DK"/>
           </a:p>
@@ -1096,7 +1096,7 @@
           <a:p>
             <a:fld id="{34290FE4-215C-594A-9672-01BBA876ED40}" type="slidenum">
               <a:rPr lang="da-DK" smtClean="0"/>
-              <a:t>‹nr.›</a:t>
+              <a:t>‹#›</a:t>
             </a:fld>
             <a:endParaRPr lang="da-DK"/>
           </a:p>
@@ -1342,7 +1342,7 @@
           <a:p>
             <a:fld id="{B4AA60AC-EAFE-B040-90AE-8434EC123AC4}" type="datetimeFigureOut">
               <a:rPr lang="da-DK" smtClean="0"/>
-              <a:t>10/05/13</a:t>
+              <a:t>14-05-2013</a:t>
             </a:fld>
             <a:endParaRPr lang="da-DK"/>
           </a:p>
@@ -1384,7 +1384,7 @@
           <a:p>
             <a:fld id="{34290FE4-215C-594A-9672-01BBA876ED40}" type="slidenum">
               <a:rPr lang="da-DK" smtClean="0"/>
-              <a:t>‹nr.›</a:t>
+              <a:t>‹#›</a:t>
             </a:fld>
             <a:endParaRPr lang="da-DK"/>
           </a:p>
@@ -1764,7 +1764,7 @@
           <a:p>
             <a:fld id="{B4AA60AC-EAFE-B040-90AE-8434EC123AC4}" type="datetimeFigureOut">
               <a:rPr lang="da-DK" smtClean="0"/>
-              <a:t>10/05/13</a:t>
+              <a:t>14-05-2013</a:t>
             </a:fld>
             <a:endParaRPr lang="da-DK"/>
           </a:p>
@@ -1806,7 +1806,7 @@
           <a:p>
             <a:fld id="{34290FE4-215C-594A-9672-01BBA876ED40}" type="slidenum">
               <a:rPr lang="da-DK" smtClean="0"/>
-              <a:t>‹nr.›</a:t>
+              <a:t>‹#›</a:t>
             </a:fld>
             <a:endParaRPr lang="da-DK"/>
           </a:p>
@@ -1882,7 +1882,7 @@
           <a:p>
             <a:fld id="{B4AA60AC-EAFE-B040-90AE-8434EC123AC4}" type="datetimeFigureOut">
               <a:rPr lang="da-DK" smtClean="0"/>
-              <a:t>10/05/13</a:t>
+              <a:t>14-05-2013</a:t>
             </a:fld>
             <a:endParaRPr lang="da-DK"/>
           </a:p>
@@ -1924,7 +1924,7 @@
           <a:p>
             <a:fld id="{34290FE4-215C-594A-9672-01BBA876ED40}" type="slidenum">
               <a:rPr lang="da-DK" smtClean="0"/>
-              <a:t>‹nr.›</a:t>
+              <a:t>‹#›</a:t>
             </a:fld>
             <a:endParaRPr lang="da-DK"/>
           </a:p>
@@ -1977,7 +1977,7 @@
           <a:p>
             <a:fld id="{B4AA60AC-EAFE-B040-90AE-8434EC123AC4}" type="datetimeFigureOut">
               <a:rPr lang="da-DK" smtClean="0"/>
-              <a:t>10/05/13</a:t>
+              <a:t>14-05-2013</a:t>
             </a:fld>
             <a:endParaRPr lang="da-DK"/>
           </a:p>
@@ -2019,7 +2019,7 @@
           <a:p>
             <a:fld id="{34290FE4-215C-594A-9672-01BBA876ED40}" type="slidenum">
               <a:rPr lang="da-DK" smtClean="0"/>
-              <a:t>‹nr.›</a:t>
+              <a:t>‹#›</a:t>
             </a:fld>
             <a:endParaRPr lang="da-DK"/>
           </a:p>
@@ -2254,7 +2254,7 @@
           <a:p>
             <a:fld id="{B4AA60AC-EAFE-B040-90AE-8434EC123AC4}" type="datetimeFigureOut">
               <a:rPr lang="da-DK" smtClean="0"/>
-              <a:t>10/05/13</a:t>
+              <a:t>14-05-2013</a:t>
             </a:fld>
             <a:endParaRPr lang="da-DK"/>
           </a:p>
@@ -2296,7 +2296,7 @@
           <a:p>
             <a:fld id="{34290FE4-215C-594A-9672-01BBA876ED40}" type="slidenum">
               <a:rPr lang="da-DK" smtClean="0"/>
-              <a:t>‹nr.›</a:t>
+              <a:t>‹#›</a:t>
             </a:fld>
             <a:endParaRPr lang="da-DK"/>
           </a:p>
@@ -2507,7 +2507,7 @@
           <a:p>
             <a:fld id="{B4AA60AC-EAFE-B040-90AE-8434EC123AC4}" type="datetimeFigureOut">
               <a:rPr lang="da-DK" smtClean="0"/>
-              <a:t>10/05/13</a:t>
+              <a:t>14-05-2013</a:t>
             </a:fld>
             <a:endParaRPr lang="da-DK"/>
           </a:p>
@@ -2549,7 +2549,7 @@
           <a:p>
             <a:fld id="{34290FE4-215C-594A-9672-01BBA876ED40}" type="slidenum">
               <a:rPr lang="da-DK" smtClean="0"/>
-              <a:t>‹nr.›</a:t>
+              <a:t>‹#›</a:t>
             </a:fld>
             <a:endParaRPr lang="da-DK"/>
           </a:p>
@@ -2720,7 +2720,7 @@
           <a:p>
             <a:fld id="{B4AA60AC-EAFE-B040-90AE-8434EC123AC4}" type="datetimeFigureOut">
               <a:rPr lang="da-DK" smtClean="0"/>
-              <a:t>10/05/13</a:t>
+              <a:t>14-05-2013</a:t>
             </a:fld>
             <a:endParaRPr lang="da-DK"/>
           </a:p>
@@ -2798,7 +2798,7 @@
           <a:p>
             <a:fld id="{34290FE4-215C-594A-9672-01BBA876ED40}" type="slidenum">
               <a:rPr lang="da-DK" smtClean="0"/>
-              <a:t>‹nr.›</a:t>
+              <a:t>‹#›</a:t>
             </a:fld>
             <a:endParaRPr lang="da-DK"/>
           </a:p>
@@ -3103,7 +3103,7 @@
         </p:nvSpPr>
         <p:spPr>
           <a:xfrm>
-            <a:off x="2921587" y="5400622"/>
+            <a:off x="2218610" y="3104436"/>
             <a:ext cx="1985525" cy="856778"/>
           </a:xfrm>
           <a:prstGeom prst="ellipse">
@@ -3140,22 +3140,38 @@
           <a:p>
             <a:pPr algn="ctr"/>
             <a:r>
-              <a:rPr lang="da-DK" dirty="0" err="1" smtClean="0">
+              <a:rPr lang="da-DK" sz="1400" dirty="0" smtClean="0">
                 <a:solidFill>
                   <a:srgbClr val="000000"/>
                 </a:solidFill>
               </a:rPr>
-              <a:t>Create</a:t>
-            </a:r>
-            <a:r>
-              <a:rPr lang="da-DK" dirty="0" smtClean="0">
+              <a:t>Create </a:t>
+            </a:r>
+            <a:r>
+              <a:rPr lang="da-DK" sz="1400" dirty="0">
                 <a:solidFill>
                   <a:srgbClr val="000000"/>
                 </a:solidFill>
               </a:rPr>
-              <a:t> new Policy</a:t>
-            </a:r>
-            <a:endParaRPr lang="da-DK" dirty="0">
+              <a:t>N</a:t>
+            </a:r>
+            <a:r>
+              <a:rPr lang="da-DK" sz="1400" dirty="0" smtClean="0">
+                <a:solidFill>
+                  <a:srgbClr val="000000"/>
+                </a:solidFill>
+              </a:rPr>
+              <a:t>ew </a:t>
+            </a:r>
+            <a:r>
+              <a:rPr lang="da-DK" sz="1400" dirty="0" smtClean="0">
+                <a:solidFill>
+                  <a:srgbClr val="000000"/>
+                </a:solidFill>
+              </a:rPr>
+              <a:t>Policy</a:t>
+            </a:r>
+            <a:endParaRPr lang="da-DK" sz="1400" dirty="0">
               <a:solidFill>
                 <a:srgbClr val="000000"/>
               </a:solidFill>
@@ -3208,7 +3224,7 @@
           <a:p>
             <a:pPr algn="ctr"/>
             <a:r>
-              <a:rPr lang="da-DK" dirty="0" err="1" smtClean="0">
+              <a:rPr lang="da-DK" sz="1400" dirty="0" err="1" smtClean="0">
                 <a:solidFill>
                   <a:srgbClr val="000000"/>
                 </a:solidFill>
@@ -3216,14 +3232,14 @@
               <a:t>Delete</a:t>
             </a:r>
             <a:r>
-              <a:rPr lang="da-DK" dirty="0" smtClean="0">
+              <a:rPr lang="da-DK" sz="1400" dirty="0" smtClean="0">
                 <a:solidFill>
                   <a:srgbClr val="000000"/>
                 </a:solidFill>
               </a:rPr>
               <a:t> Policy</a:t>
             </a:r>
-            <a:endParaRPr lang="da-DK" dirty="0">
+            <a:endParaRPr lang="da-DK" sz="1400" dirty="0">
               <a:solidFill>
                 <a:srgbClr val="000000"/>
               </a:solidFill>
@@ -3233,13 +3249,13 @@
       </p:sp>
       <p:sp>
         <p:nvSpPr>
-          <p:cNvPr id="6" name="Ellipse 5"/>
+          <p:cNvPr id="7" name="Ellipse 6"/>
           <p:cNvSpPr/>
           <p:nvPr/>
         </p:nvSpPr>
         <p:spPr>
           <a:xfrm>
-            <a:off x="5681974" y="1373967"/>
+            <a:off x="5681973" y="1373251"/>
             <a:ext cx="1985525" cy="856778"/>
           </a:xfrm>
           <a:prstGeom prst="ellipse">
@@ -3276,30 +3292,22 @@
           <a:p>
             <a:pPr algn="ctr"/>
             <a:r>
-              <a:rPr lang="da-DK" dirty="0" err="1" smtClean="0">
+              <a:rPr lang="da-DK" sz="1400" dirty="0" smtClean="0">
                 <a:solidFill>
                   <a:srgbClr val="000000"/>
                 </a:solidFill>
               </a:rPr>
-              <a:t>Modify</a:t>
-            </a:r>
-            <a:r>
-              <a:rPr lang="da-DK" dirty="0">
-                <a:solidFill>
-                  <a:srgbClr val="000000"/>
-                </a:solidFill>
-              </a:rPr>
-              <a:t> </a:t>
-            </a:r>
-            <a:r>
-              <a:rPr lang="da-DK" dirty="0" smtClean="0">
+              <a:t>Enable / Disable </a:t>
+            </a:r>
+            <a:r>
+              <a:rPr lang="da-DK" sz="1400" dirty="0" smtClean="0">
                 <a:solidFill>
                   <a:srgbClr val="000000"/>
                 </a:solidFill>
               </a:rPr>
               <a:t>Policy</a:t>
             </a:r>
-            <a:endParaRPr lang="da-DK" dirty="0">
+            <a:endParaRPr lang="da-DK" sz="1400" dirty="0">
               <a:solidFill>
                 <a:srgbClr val="000000"/>
               </a:solidFill>
@@ -3309,13 +3317,13 @@
       </p:sp>
       <p:sp>
         <p:nvSpPr>
-          <p:cNvPr id="7" name="Ellipse 6"/>
+          <p:cNvPr id="9" name="Ellipse 8"/>
           <p:cNvSpPr/>
           <p:nvPr/>
         </p:nvSpPr>
         <p:spPr>
           <a:xfrm>
-            <a:off x="5681974" y="2331542"/>
+            <a:off x="1512104" y="1932919"/>
             <a:ext cx="1985525" cy="856778"/>
           </a:xfrm>
           <a:prstGeom prst="ellipse">
@@ -3352,22 +3360,22 @@
           <a:p>
             <a:pPr algn="ctr"/>
             <a:r>
-              <a:rPr lang="da-DK" dirty="0" err="1" smtClean="0">
+              <a:rPr lang="da-DK" sz="1400" dirty="0" smtClean="0">
                 <a:solidFill>
                   <a:srgbClr val="000000"/>
                 </a:solidFill>
               </a:rPr>
-              <a:t>Enable</a:t>
-            </a:r>
-            <a:r>
-              <a:rPr lang="da-DK" dirty="0" smtClean="0">
+              <a:t>View </a:t>
+            </a:r>
+            <a:r>
+              <a:rPr lang="da-DK" sz="1400" dirty="0" smtClean="0">
                 <a:solidFill>
                   <a:srgbClr val="000000"/>
                 </a:solidFill>
               </a:rPr>
-              <a:t> Policy</a:t>
-            </a:r>
-            <a:endParaRPr lang="da-DK" dirty="0">
+              <a:t>All Policies</a:t>
+            </a:r>
+            <a:endParaRPr lang="da-DK" sz="1400" dirty="0">
               <a:solidFill>
                 <a:srgbClr val="000000"/>
               </a:solidFill>
@@ -3375,251 +3383,19 @@
           </a:p>
         </p:txBody>
       </p:sp>
-      <p:sp>
-        <p:nvSpPr>
-          <p:cNvPr id="8" name="Ellipse 7"/>
-          <p:cNvSpPr/>
-          <p:nvPr/>
-        </p:nvSpPr>
-        <p:spPr>
-          <a:xfrm>
-            <a:off x="5681974" y="3289117"/>
-            <a:ext cx="1985525" cy="856778"/>
-          </a:xfrm>
-          <a:prstGeom prst="ellipse">
-            <a:avLst/>
-          </a:prstGeom>
-          <a:noFill/>
-          <a:ln>
-            <a:solidFill>
-              <a:schemeClr val="tx1">
-                <a:lumMod val="95000"/>
-                <a:lumOff val="5000"/>
-              </a:schemeClr>
-            </a:solidFill>
-          </a:ln>
-          <a:effectLst/>
-        </p:spPr>
-        <p:style>
-          <a:lnRef idx="1">
-            <a:schemeClr val="accent1"/>
-          </a:lnRef>
-          <a:fillRef idx="3">
-            <a:schemeClr val="accent1"/>
-          </a:fillRef>
-          <a:effectRef idx="2">
-            <a:schemeClr val="accent1"/>
-          </a:effectRef>
-          <a:fontRef idx="minor">
-            <a:schemeClr val="lt1"/>
-          </a:fontRef>
-        </p:style>
-        <p:txBody>
-          <a:bodyPr rtlCol="0" anchor="ctr"/>
-          <a:lstStyle/>
-          <a:p>
-            <a:pPr algn="ctr"/>
-            <a:r>
-              <a:rPr lang="da-DK" dirty="0" smtClean="0">
-                <a:solidFill>
-                  <a:srgbClr val="000000"/>
-                </a:solidFill>
-              </a:rPr>
-              <a:t>Disable Policy</a:t>
-            </a:r>
-            <a:endParaRPr lang="da-DK" dirty="0">
-              <a:solidFill>
-                <a:srgbClr val="000000"/>
-              </a:solidFill>
-            </a:endParaRPr>
-          </a:p>
-        </p:txBody>
-      </p:sp>
-      <p:sp>
-        <p:nvSpPr>
-          <p:cNvPr id="9" name="Ellipse 8"/>
-          <p:cNvSpPr/>
-          <p:nvPr/>
-        </p:nvSpPr>
-        <p:spPr>
-          <a:xfrm>
-            <a:off x="2921587" y="1939122"/>
-            <a:ext cx="1985525" cy="856778"/>
-          </a:xfrm>
-          <a:prstGeom prst="ellipse">
-            <a:avLst/>
-          </a:prstGeom>
-          <a:noFill/>
-          <a:ln>
-            <a:solidFill>
-              <a:schemeClr val="tx1">
-                <a:lumMod val="95000"/>
-                <a:lumOff val="5000"/>
-              </a:schemeClr>
-            </a:solidFill>
-          </a:ln>
-          <a:effectLst/>
-        </p:spPr>
-        <p:style>
-          <a:lnRef idx="1">
-            <a:schemeClr val="accent1"/>
-          </a:lnRef>
-          <a:fillRef idx="3">
-            <a:schemeClr val="accent1"/>
-          </a:fillRef>
-          <a:effectRef idx="2">
-            <a:schemeClr val="accent1"/>
-          </a:effectRef>
-          <a:fontRef idx="minor">
-            <a:schemeClr val="lt1"/>
-          </a:fontRef>
-        </p:style>
-        <p:txBody>
-          <a:bodyPr rtlCol="0" anchor="ctr"/>
-          <a:lstStyle/>
-          <a:p>
-            <a:pPr algn="ctr"/>
-            <a:r>
-              <a:rPr lang="da-DK" dirty="0" err="1" smtClean="0">
-                <a:solidFill>
-                  <a:srgbClr val="000000"/>
-                </a:solidFill>
-              </a:rPr>
-              <a:t>View</a:t>
-            </a:r>
-            <a:r>
-              <a:rPr lang="da-DK" dirty="0">
-                <a:solidFill>
-                  <a:srgbClr val="000000"/>
-                </a:solidFill>
-              </a:rPr>
-              <a:t> </a:t>
-            </a:r>
-            <a:r>
-              <a:rPr lang="da-DK" dirty="0" smtClean="0">
-                <a:solidFill>
-                  <a:srgbClr val="000000"/>
-                </a:solidFill>
-              </a:rPr>
-              <a:t>All </a:t>
-            </a:r>
-            <a:r>
-              <a:rPr lang="da-DK" dirty="0" err="1" smtClean="0">
-                <a:solidFill>
-                  <a:srgbClr val="000000"/>
-                </a:solidFill>
-              </a:rPr>
-              <a:t>Policies</a:t>
-            </a:r>
-            <a:endParaRPr lang="da-DK" dirty="0">
-              <a:solidFill>
-                <a:srgbClr val="000000"/>
-              </a:solidFill>
-            </a:endParaRPr>
-          </a:p>
-        </p:txBody>
-      </p:sp>
-      <p:sp>
-        <p:nvSpPr>
-          <p:cNvPr id="11" name="Smilende ansigt 10"/>
-          <p:cNvSpPr/>
-          <p:nvPr/>
-        </p:nvSpPr>
-        <p:spPr>
-          <a:xfrm>
-            <a:off x="1882585" y="3813536"/>
-            <a:ext cx="1074683" cy="1074683"/>
-          </a:xfrm>
-          <a:prstGeom prst="smileyFace">
-            <a:avLst/>
-          </a:prstGeom>
-          <a:noFill/>
-          <a:ln>
-            <a:solidFill>
-              <a:schemeClr val="tx1">
-                <a:lumMod val="95000"/>
-                <a:lumOff val="5000"/>
-              </a:schemeClr>
-            </a:solidFill>
-          </a:ln>
-          <a:effectLst/>
-        </p:spPr>
-        <p:style>
-          <a:lnRef idx="1">
-            <a:schemeClr val="accent1"/>
-          </a:lnRef>
-          <a:fillRef idx="3">
-            <a:schemeClr val="accent1"/>
-          </a:fillRef>
-          <a:effectRef idx="2">
-            <a:schemeClr val="accent1"/>
-          </a:effectRef>
-          <a:fontRef idx="minor">
-            <a:schemeClr val="lt1"/>
-          </a:fontRef>
-        </p:style>
-        <p:txBody>
-          <a:bodyPr rtlCol="0" anchor="ctr"/>
-          <a:lstStyle/>
-          <a:p>
-            <a:pPr algn="ctr"/>
-            <a:endParaRPr lang="da-DK" dirty="0" smtClean="0"/>
-          </a:p>
-          <a:p>
-            <a:pPr algn="ctr"/>
-            <a:endParaRPr lang="da-DK" dirty="0"/>
-          </a:p>
-          <a:p>
-            <a:pPr algn="ctr"/>
-            <a:endParaRPr lang="da-DK" dirty="0" smtClean="0"/>
-          </a:p>
-          <a:p>
-            <a:pPr algn="ctr"/>
-            <a:endParaRPr lang="da-DK" dirty="0"/>
-          </a:p>
-          <a:p>
-            <a:pPr algn="ctr"/>
-            <a:endParaRPr lang="da-DK" dirty="0" smtClean="0"/>
-          </a:p>
-          <a:p>
-            <a:pPr algn="ctr"/>
-            <a:endParaRPr lang="da-DK" dirty="0">
-              <a:solidFill>
-                <a:schemeClr val="tx1"/>
-              </a:solidFill>
-            </a:endParaRPr>
-          </a:p>
-          <a:p>
-            <a:pPr algn="ctr"/>
-            <a:r>
-              <a:rPr lang="da-DK" dirty="0" smtClean="0">
-                <a:solidFill>
-                  <a:schemeClr val="tx1"/>
-                </a:solidFill>
-              </a:rPr>
-              <a:t>User</a:t>
-            </a:r>
-            <a:endParaRPr lang="da-DK" dirty="0">
-              <a:solidFill>
-                <a:schemeClr val="tx1"/>
-              </a:solidFill>
-            </a:endParaRPr>
-          </a:p>
-        </p:txBody>
-      </p:sp>
       <p:cxnSp>
         <p:nvCxnSpPr>
           <p:cNvPr id="17" name="Buet forbindelse 16"/>
           <p:cNvCxnSpPr>
-            <a:stCxn id="11" idx="7"/>
-            <a:endCxn id="9" idx="4"/>
+            <a:stCxn id="1029" idx="3"/>
+            <a:endCxn id="9" idx="2"/>
           </p:cNvCxnSpPr>
           <p:nvPr/>
         </p:nvCxnSpPr>
         <p:spPr>
-          <a:xfrm rot="5400000" flipH="1" flipV="1">
-            <a:off x="2769607" y="2826177"/>
-            <a:ext cx="1175020" cy="1114466"/>
+          <a:xfrm flipV="1">
+            <a:off x="1073496" y="2361308"/>
+            <a:ext cx="438608" cy="26364"/>
           </a:xfrm>
           <a:prstGeom prst="curvedConnector3">
             <a:avLst>
@@ -3656,61 +3432,19 @@
         <p:nvCxnSpPr>
           <p:cNvPr id="21" name="Buet forbindelse 20"/>
           <p:cNvCxnSpPr>
-            <a:stCxn id="9" idx="0"/>
             <a:endCxn id="5" idx="2"/>
           </p:cNvCxnSpPr>
           <p:nvPr/>
         </p:nvCxnSpPr>
         <p:spPr>
-          <a:xfrm rot="5400000" flipH="1" flipV="1">
-            <a:off x="4245952" y="503100"/>
-            <a:ext cx="1104420" cy="1767624"/>
+          <a:xfrm flipV="1">
+            <a:off x="4113881" y="834702"/>
+            <a:ext cx="1568093" cy="302794"/>
           </a:xfrm>
-          <a:prstGeom prst="curvedConnector2">
-            <a:avLst/>
-          </a:prstGeom>
-          <a:ln w="12700">
-            <a:solidFill>
-              <a:schemeClr val="tx1">
-                <a:lumMod val="95000"/>
-                <a:lumOff val="5000"/>
-              </a:schemeClr>
-            </a:solidFill>
-            <a:tailEnd type="triangle" w="lg" len="med"/>
-          </a:ln>
-          <a:effectLst/>
-        </p:spPr>
-        <p:style>
-          <a:lnRef idx="2">
-            <a:schemeClr val="accent1"/>
-          </a:lnRef>
-          <a:fillRef idx="0">
-            <a:schemeClr val="accent1"/>
-          </a:fillRef>
-          <a:effectRef idx="1">
-            <a:schemeClr val="accent1"/>
-          </a:effectRef>
-          <a:fontRef idx="minor">
-            <a:schemeClr val="tx1"/>
-          </a:fontRef>
-        </p:style>
-      </p:cxnSp>
-      <p:cxnSp>
-        <p:nvCxnSpPr>
-          <p:cNvPr id="23" name="Buet forbindelse 22"/>
-          <p:cNvCxnSpPr>
-            <a:stCxn id="9" idx="7"/>
-            <a:endCxn id="6" idx="2"/>
-          </p:cNvCxnSpPr>
-          <p:nvPr/>
-        </p:nvCxnSpPr>
-        <p:spPr>
-          <a:xfrm rot="5400000" flipH="1" flipV="1">
-            <a:off x="5018037" y="1400658"/>
-            <a:ext cx="262238" cy="1065635"/>
-          </a:xfrm>
-          <a:prstGeom prst="curvedConnector2">
-            <a:avLst/>
+          <a:prstGeom prst="curvedConnector3">
+            <a:avLst>
+              <a:gd name="adj1" fmla="val 50000"/>
+            </a:avLst>
           </a:prstGeom>
           <a:ln w="12700">
             <a:solidFill>
@@ -3742,18 +3476,20 @@
         <p:nvCxnSpPr>
           <p:cNvPr id="25" name="Buet forbindelse 24"/>
           <p:cNvCxnSpPr>
-            <a:stCxn id="9" idx="6"/>
-            <a:endCxn id="7" idx="2"/>
+            <a:stCxn id="9" idx="0"/>
+            <a:endCxn id="28" idx="4"/>
           </p:cNvCxnSpPr>
           <p:nvPr/>
         </p:nvCxnSpPr>
         <p:spPr>
-          <a:xfrm>
-            <a:off x="4907112" y="2367511"/>
-            <a:ext cx="774862" cy="392420"/>
+          <a:xfrm rot="5400000" flipH="1" flipV="1">
+            <a:off x="2629476" y="1441276"/>
+            <a:ext cx="367034" cy="616252"/>
           </a:xfrm>
           <a:prstGeom prst="curvedConnector3">
-            <a:avLst/>
+            <a:avLst>
+              <a:gd name="adj1" fmla="val 50000"/>
+            </a:avLst>
           </a:prstGeom>
           <a:ln w="12700">
             <a:solidFill>
@@ -3785,18 +3521,19 @@
         <p:nvCxnSpPr>
           <p:cNvPr id="27" name="Buet forbindelse 26"/>
           <p:cNvCxnSpPr>
-            <a:stCxn id="9" idx="5"/>
-            <a:endCxn id="8" idx="2"/>
+            <a:endCxn id="7" idx="2"/>
           </p:cNvCxnSpPr>
           <p:nvPr/>
         </p:nvCxnSpPr>
         <p:spPr>
-          <a:xfrm rot="16200000" flipH="1">
-            <a:off x="4625617" y="2661149"/>
-            <a:ext cx="1047078" cy="1065635"/>
+          <a:xfrm>
+            <a:off x="4113882" y="1137497"/>
+            <a:ext cx="1568091" cy="664143"/>
           </a:xfrm>
-          <a:prstGeom prst="curvedConnector2">
-            <a:avLst/>
+          <a:prstGeom prst="curvedConnector3">
+            <a:avLst>
+              <a:gd name="adj1" fmla="val 50000"/>
+            </a:avLst>
           </a:prstGeom>
           <a:ln w="12700">
             <a:solidFill>
@@ -3828,18 +3565,20 @@
         <p:nvCxnSpPr>
           <p:cNvPr id="37" name="Buet forbindelse 36"/>
           <p:cNvCxnSpPr>
-            <a:stCxn id="11" idx="6"/>
+            <a:stCxn id="9" idx="4"/>
             <a:endCxn id="4" idx="0"/>
           </p:cNvCxnSpPr>
           <p:nvPr/>
         </p:nvCxnSpPr>
         <p:spPr>
-          <a:xfrm>
-            <a:off x="2957268" y="4350878"/>
-            <a:ext cx="957082" cy="1049744"/>
+          <a:xfrm rot="16200000" flipH="1">
+            <a:off x="2700751" y="2593813"/>
+            <a:ext cx="314739" cy="706506"/>
           </a:xfrm>
-          <a:prstGeom prst="curvedConnector2">
-            <a:avLst/>
+          <a:prstGeom prst="curvedConnector3">
+            <a:avLst>
+              <a:gd name="adj1" fmla="val 50000"/>
+            </a:avLst>
           </a:prstGeom>
           <a:ln w="12700">
             <a:solidFill>
@@ -3864,6 +3603,212 @@
           </a:fontRef>
         </p:style>
       </p:cxnSp>
+      <p:pic>
+        <p:nvPicPr>
+          <p:cNvPr id="1029" name="Picture 5" descr="C:\Users\Nicolas\Desktop\Untitled-2.png"/>
+          <p:cNvPicPr>
+            <a:picLocks noChangeAspect="1" noChangeArrowheads="1"/>
+          </p:cNvPicPr>
+          <p:nvPr/>
+        </p:nvPicPr>
+        <p:blipFill>
+          <a:blip r:embed="rId2">
+            <a:extLst>
+              <a:ext uri="{28A0092B-C50C-407E-A947-70E740481C1C}">
+                <a14:useLocalDpi xmlns:a14="http://schemas.microsoft.com/office/drawing/2010/main" val="0"/>
+              </a:ext>
+            </a:extLst>
+          </a:blip>
+          <a:srcRect/>
+          <a:stretch>
+            <a:fillRect/>
+          </a:stretch>
+        </p:blipFill>
+        <p:spPr bwMode="auto">
+          <a:xfrm>
+            <a:off x="333376" y="1979765"/>
+            <a:ext cx="740120" cy="815814"/>
+          </a:xfrm>
+          <a:prstGeom prst="rect">
+            <a:avLst/>
+          </a:prstGeom>
+          <a:noFill/>
+          <a:extLst>
+            <a:ext uri="{909E8E84-426E-40DD-AFC4-6F175D3DCCD1}">
+              <a14:hiddenFill xmlns:a14="http://schemas.microsoft.com/office/drawing/2010/main">
+                <a:solidFill>
+                  <a:srgbClr val="FFFFFF"/>
+                </a:solidFill>
+              </a14:hiddenFill>
+            </a:ext>
+          </a:extLst>
+        </p:spPr>
+      </p:pic>
+      <p:sp>
+        <p:nvSpPr>
+          <p:cNvPr id="28" name="Ellipse 3"/>
+          <p:cNvSpPr/>
+          <p:nvPr/>
+        </p:nvSpPr>
+        <p:spPr>
+          <a:xfrm>
+            <a:off x="2128356" y="709107"/>
+            <a:ext cx="1985525" cy="856778"/>
+          </a:xfrm>
+          <a:prstGeom prst="ellipse">
+            <a:avLst/>
+          </a:prstGeom>
+          <a:noFill/>
+          <a:ln>
+            <a:solidFill>
+              <a:schemeClr val="tx1">
+                <a:lumMod val="95000"/>
+                <a:lumOff val="5000"/>
+              </a:schemeClr>
+            </a:solidFill>
+          </a:ln>
+          <a:effectLst/>
+        </p:spPr>
+        <p:style>
+          <a:lnRef idx="1">
+            <a:schemeClr val="accent1"/>
+          </a:lnRef>
+          <a:fillRef idx="3">
+            <a:schemeClr val="accent1"/>
+          </a:fillRef>
+          <a:effectRef idx="2">
+            <a:schemeClr val="accent1"/>
+          </a:effectRef>
+          <a:fontRef idx="minor">
+            <a:schemeClr val="lt1"/>
+          </a:fontRef>
+        </p:style>
+        <p:txBody>
+          <a:bodyPr rtlCol="0" anchor="ctr"/>
+          <a:lstStyle/>
+          <a:p>
+            <a:pPr algn="ctr"/>
+            <a:r>
+              <a:rPr lang="da-DK" sz="1400" dirty="0" smtClean="0">
+                <a:solidFill>
+                  <a:srgbClr val="000000"/>
+                </a:solidFill>
+              </a:rPr>
+              <a:t>Modify Policy</a:t>
+            </a:r>
+            <a:endParaRPr lang="da-DK" sz="1400" dirty="0">
+              <a:solidFill>
+                <a:srgbClr val="000000"/>
+              </a:solidFill>
+            </a:endParaRPr>
+          </a:p>
+        </p:txBody>
+      </p:sp>
+      <p:cxnSp>
+        <p:nvCxnSpPr>
+          <p:cNvPr id="39" name="Buet forbindelse 26"/>
+          <p:cNvCxnSpPr>
+            <a:stCxn id="28" idx="6"/>
+            <a:endCxn id="41" idx="2"/>
+          </p:cNvCxnSpPr>
+          <p:nvPr/>
+        </p:nvCxnSpPr>
+        <p:spPr>
+          <a:xfrm>
+            <a:off x="4113881" y="1137496"/>
+            <a:ext cx="1568093" cy="1691091"/>
+          </a:xfrm>
+          <a:prstGeom prst="curvedConnector3">
+            <a:avLst>
+              <a:gd name="adj1" fmla="val 50000"/>
+            </a:avLst>
+          </a:prstGeom>
+          <a:ln w="12700">
+            <a:solidFill>
+              <a:schemeClr val="tx1">
+                <a:lumMod val="95000"/>
+                <a:lumOff val="5000"/>
+              </a:schemeClr>
+            </a:solidFill>
+            <a:tailEnd type="triangle" w="lg" len="med"/>
+          </a:ln>
+          <a:effectLst/>
+        </p:spPr>
+        <p:style>
+          <a:lnRef idx="2">
+            <a:schemeClr val="accent1"/>
+          </a:lnRef>
+          <a:fillRef idx="0">
+            <a:schemeClr val="accent1"/>
+          </a:fillRef>
+          <a:effectRef idx="1">
+            <a:schemeClr val="accent1"/>
+          </a:effectRef>
+          <a:fontRef idx="minor">
+            <a:schemeClr val="tx1"/>
+          </a:fontRef>
+        </p:style>
+      </p:cxnSp>
+      <p:sp>
+        <p:nvSpPr>
+          <p:cNvPr id="41" name="Ellipse 6"/>
+          <p:cNvSpPr/>
+          <p:nvPr/>
+        </p:nvSpPr>
+        <p:spPr>
+          <a:xfrm>
+            <a:off x="5681974" y="2400198"/>
+            <a:ext cx="1985525" cy="856778"/>
+          </a:xfrm>
+          <a:prstGeom prst="ellipse">
+            <a:avLst/>
+          </a:prstGeom>
+          <a:noFill/>
+          <a:ln>
+            <a:solidFill>
+              <a:schemeClr val="tx1">
+                <a:lumMod val="95000"/>
+                <a:lumOff val="5000"/>
+              </a:schemeClr>
+            </a:solidFill>
+          </a:ln>
+          <a:effectLst/>
+        </p:spPr>
+        <p:style>
+          <a:lnRef idx="1">
+            <a:schemeClr val="accent1"/>
+          </a:lnRef>
+          <a:fillRef idx="3">
+            <a:schemeClr val="accent1"/>
+          </a:fillRef>
+          <a:effectRef idx="2">
+            <a:schemeClr val="accent1"/>
+          </a:effectRef>
+          <a:fontRef idx="minor">
+            <a:schemeClr val="lt1"/>
+          </a:fontRef>
+        </p:style>
+        <p:txBody>
+          <a:bodyPr rtlCol="0" anchor="ctr"/>
+          <a:lstStyle/>
+          <a:p>
+            <a:pPr algn="ctr"/>
+            <a:r>
+              <a:rPr lang="da-DK" sz="1400" dirty="0" smtClean="0">
+                <a:solidFill>
+                  <a:srgbClr val="000000"/>
+                </a:solidFill>
+              </a:rPr>
+              <a:t>Setup Expressions</a:t>
+            </a:r>
+            <a:endParaRPr lang="da-DK" sz="1400" dirty="0">
+              <a:solidFill>
+                <a:srgbClr val="000000"/>
+              </a:solidFill>
+            </a:endParaRPr>
+          </a:p>
+        </p:txBody>
+      </p:sp>
     </p:spTree>
     <p:extLst>
       <p:ext uri="{BB962C8B-B14F-4D97-AF65-F5344CB8AC3E}">
@@ -3874,6 +3819,13 @@
   <p:clrMapOvr>
     <a:masterClrMapping/>
   </p:clrMapOvr>
+  <p:timing>
+    <p:tnLst>
+      <p:par>
+        <p:cTn id="1" dur="indefinite" restart="never" nodeType="tmRoot"/>
+      </p:par>
+    </p:tnLst>
+  </p:timing>
 </p:sld>
 </file>
 

</xml_diff>